<commit_message>
Fall Final Briefing Changes
</commit_message>
<xml_diff>
--- a/Briefings/FallFinalBriefing.pptx
+++ b/Briefings/FallFinalBriefing.pptx
@@ -12,21 +12,26 @@
     <p:sldId id="270" r:id="rId6"/>
     <p:sldId id="272" r:id="rId7"/>
     <p:sldId id="275" r:id="rId8"/>
-    <p:sldId id="279" r:id="rId9"/>
-    <p:sldId id="278" r:id="rId10"/>
-    <p:sldId id="280" r:id="rId11"/>
-    <p:sldId id="276" r:id="rId12"/>
-    <p:sldId id="273" r:id="rId13"/>
-    <p:sldId id="266" r:id="rId14"/>
-    <p:sldId id="277" r:id="rId15"/>
-    <p:sldId id="267" r:id="rId16"/>
-    <p:sldId id="263" r:id="rId17"/>
-    <p:sldId id="265" r:id="rId18"/>
-    <p:sldId id="264" r:id="rId19"/>
-    <p:sldId id="260" r:id="rId20"/>
-    <p:sldId id="261" r:id="rId21"/>
-    <p:sldId id="262" r:id="rId22"/>
-    <p:sldId id="268" r:id="rId23"/>
+    <p:sldId id="285" r:id="rId9"/>
+    <p:sldId id="286" r:id="rId10"/>
+    <p:sldId id="287" r:id="rId11"/>
+    <p:sldId id="288" r:id="rId12"/>
+    <p:sldId id="289" r:id="rId13"/>
+    <p:sldId id="279" r:id="rId14"/>
+    <p:sldId id="278" r:id="rId15"/>
+    <p:sldId id="280" r:id="rId16"/>
+    <p:sldId id="276" r:id="rId17"/>
+    <p:sldId id="273" r:id="rId18"/>
+    <p:sldId id="266" r:id="rId19"/>
+    <p:sldId id="277" r:id="rId20"/>
+    <p:sldId id="267" r:id="rId21"/>
+    <p:sldId id="263" r:id="rId22"/>
+    <p:sldId id="265" r:id="rId23"/>
+    <p:sldId id="264" r:id="rId24"/>
+    <p:sldId id="260" r:id="rId25"/>
+    <p:sldId id="261" r:id="rId26"/>
+    <p:sldId id="262" r:id="rId27"/>
+    <p:sldId id="268" r:id="rId28"/>
   </p:sldIdLst>
   <p:sldSz cx="9144000" cy="6858000" type="screen4x3"/>
   <p:notesSz cx="6858000" cy="9144000"/>
@@ -336,7 +341,7 @@
             <a:fld id="{542ED6D8-967B-4FDD-8539-23116DD8CE38}" type="datetimeFigureOut">
               <a:rPr lang="en-US" smtClean="0"/>
               <a:pPr/>
-              <a:t>12/2/2014</a:t>
+              <a:t>12/3/2014</a:t>
             </a:fld>
             <a:endParaRPr lang="en-US"/>
           </a:p>
@@ -532,7 +537,7 @@
             <a:fld id="{542ED6D8-967B-4FDD-8539-23116DD8CE38}" type="datetimeFigureOut">
               <a:rPr lang="en-US" smtClean="0"/>
               <a:pPr/>
-              <a:t>12/2/2014</a:t>
+              <a:t>12/3/2014</a:t>
             </a:fld>
             <a:endParaRPr lang="en-US"/>
           </a:p>
@@ -722,7 +727,7 @@
             <a:fld id="{542ED6D8-967B-4FDD-8539-23116DD8CE38}" type="datetimeFigureOut">
               <a:rPr lang="en-US" smtClean="0"/>
               <a:pPr/>
-              <a:t>12/2/2014</a:t>
+              <a:t>12/3/2014</a:t>
             </a:fld>
             <a:endParaRPr lang="en-US"/>
           </a:p>
@@ -953,7 +958,7 @@
             <a:fld id="{542ED6D8-967B-4FDD-8539-23116DD8CE38}" type="datetimeFigureOut">
               <a:rPr lang="en-US" smtClean="0"/>
               <a:pPr/>
-              <a:t>12/2/2014</a:t>
+              <a:t>12/3/2014</a:t>
             </a:fld>
             <a:endParaRPr lang="en-US"/>
           </a:p>
@@ -1236,7 +1241,7 @@
             <a:fld id="{542ED6D8-967B-4FDD-8539-23116DD8CE38}" type="datetimeFigureOut">
               <a:rPr lang="en-US" smtClean="0"/>
               <a:pPr/>
-              <a:t>12/2/2014</a:t>
+              <a:t>12/3/2014</a:t>
             </a:fld>
             <a:endParaRPr lang="en-US"/>
           </a:p>
@@ -1526,7 +1531,7 @@
             <a:fld id="{542ED6D8-967B-4FDD-8539-23116DD8CE38}" type="datetimeFigureOut">
               <a:rPr lang="en-US" smtClean="0"/>
               <a:pPr/>
-              <a:t>12/2/2014</a:t>
+              <a:t>12/3/2014</a:t>
             </a:fld>
             <a:endParaRPr lang="en-US"/>
           </a:p>
@@ -2082,7 +2087,7 @@
             <a:fld id="{542ED6D8-967B-4FDD-8539-23116DD8CE38}" type="datetimeFigureOut">
               <a:rPr lang="en-US" smtClean="0"/>
               <a:pPr/>
-              <a:t>12/2/2014</a:t>
+              <a:t>12/3/2014</a:t>
             </a:fld>
             <a:endParaRPr lang="en-US"/>
           </a:p>
@@ -2215,7 +2220,7 @@
             <a:fld id="{542ED6D8-967B-4FDD-8539-23116DD8CE38}" type="datetimeFigureOut">
               <a:rPr lang="en-US" smtClean="0"/>
               <a:pPr/>
-              <a:t>12/2/2014</a:t>
+              <a:t>12/3/2014</a:t>
             </a:fld>
             <a:endParaRPr lang="en-US"/>
           </a:p>
@@ -2367,7 +2372,7 @@
             <a:fld id="{542ED6D8-967B-4FDD-8539-23116DD8CE38}" type="datetimeFigureOut">
               <a:rPr lang="en-US" smtClean="0"/>
               <a:pPr/>
-              <a:t>12/2/2014</a:t>
+              <a:t>12/3/2014</a:t>
             </a:fld>
             <a:endParaRPr lang="en-US"/>
           </a:p>
@@ -2690,7 +2695,7 @@
             <a:fld id="{542ED6D8-967B-4FDD-8539-23116DD8CE38}" type="datetimeFigureOut">
               <a:rPr lang="en-US" smtClean="0"/>
               <a:pPr/>
-              <a:t>12/2/2014</a:t>
+              <a:t>12/3/2014</a:t>
             </a:fld>
             <a:endParaRPr lang="en-US"/>
           </a:p>
@@ -2989,7 +2994,7 @@
             <a:fld id="{542ED6D8-967B-4FDD-8539-23116DD8CE38}" type="datetimeFigureOut">
               <a:rPr lang="en-US" smtClean="0"/>
               <a:pPr/>
-              <a:t>12/2/2014</a:t>
+              <a:t>12/3/2014</a:t>
             </a:fld>
             <a:endParaRPr lang="en-US"/>
           </a:p>
@@ -3236,7 +3241,7 @@
             <a:fld id="{542ED6D8-967B-4FDD-8539-23116DD8CE38}" type="datetimeFigureOut">
               <a:rPr lang="en-US" smtClean="0"/>
               <a:pPr/>
-              <a:t>12/2/2014</a:t>
+              <a:t>12/3/2014</a:t>
             </a:fld>
             <a:endParaRPr lang="en-US"/>
           </a:p>
@@ -3882,62 +3887,9 @@
           <a:chExt cx="0" cy="0"/>
         </a:xfrm>
       </p:grpSpPr>
-      <p:sp>
-        <p:nvSpPr>
-          <p:cNvPr id="2" name="Title 1"/>
-          <p:cNvSpPr>
-            <a:spLocks noGrp="1"/>
-          </p:cNvSpPr>
-          <p:nvPr>
-            <p:ph type="title"/>
-          </p:nvPr>
-        </p:nvSpPr>
-        <p:spPr/>
-        <p:txBody>
-          <a:bodyPr/>
-          <a:lstStyle/>
-          <a:p>
-            <a:pPr algn="ctr"/>
-            <a:r>
-              <a:rPr lang="en-US" dirty="0" smtClean="0"/>
-              <a:t>Client Suggested Revisions</a:t>
-            </a:r>
-            <a:endParaRPr lang="en-US" dirty="0"/>
-          </a:p>
-        </p:txBody>
-      </p:sp>
-      <p:sp>
-        <p:nvSpPr>
-          <p:cNvPr id="4" name="Content Placeholder 3"/>
-          <p:cNvSpPr>
-            <a:spLocks noGrp="1"/>
-          </p:cNvSpPr>
-          <p:nvPr>
-            <p:ph sz="half" idx="2"/>
-          </p:nvPr>
-        </p:nvSpPr>
-        <p:spPr/>
-        <p:txBody>
-          <a:bodyPr/>
-          <a:lstStyle/>
-          <a:p>
-            <a:r>
-              <a:rPr lang="en-US" dirty="0" smtClean="0"/>
-              <a:t>No preselected defaults for toggle switches</a:t>
-            </a:r>
-          </a:p>
-          <a:p>
-            <a:r>
-              <a:rPr lang="en-US" dirty="0" smtClean="0"/>
-              <a:t>Remove edit/view functionality for previously entered data</a:t>
-            </a:r>
-            <a:endParaRPr lang="en-US" dirty="0"/>
-          </a:p>
-        </p:txBody>
-      </p:sp>
       <p:pic>
         <p:nvPicPr>
-          <p:cNvPr id="32770" name="Picture 2"/>
+          <p:cNvPr id="3074" name="Picture 2"/>
           <p:cNvPicPr>
             <a:picLocks noChangeAspect="1" noChangeArrowheads="1"/>
           </p:cNvPicPr>
@@ -3952,8 +3904,8 @@
         </p:blipFill>
         <p:spPr bwMode="auto">
           <a:xfrm>
-            <a:off x="762000" y="1905000"/>
-            <a:ext cx="666750" cy="962025"/>
+            <a:off x="-29744" y="0"/>
+            <a:ext cx="9326143" cy="6858000"/>
           </a:xfrm>
           <a:prstGeom prst="rect">
             <a:avLst/>
@@ -3967,203 +3919,18 @@
           </a:ln>
         </p:spPr>
       </p:pic>
-      <p:pic>
-        <p:nvPicPr>
-          <p:cNvPr id="32771" name="Picture 3"/>
-          <p:cNvPicPr>
-            <a:picLocks noChangeAspect="1" noChangeArrowheads="1"/>
-          </p:cNvPicPr>
-          <p:nvPr/>
-        </p:nvPicPr>
-        <p:blipFill>
-          <a:blip r:embed="rId3" cstate="print"/>
-          <a:srcRect/>
-          <a:stretch>
-            <a:fillRect/>
-          </a:stretch>
-        </p:blipFill>
-        <p:spPr bwMode="auto">
-          <a:xfrm>
-            <a:off x="2819400" y="2133600"/>
-            <a:ext cx="771525" cy="476250"/>
-          </a:xfrm>
-          <a:prstGeom prst="rect">
-            <a:avLst/>
-          </a:prstGeom>
-          <a:noFill/>
-          <a:ln w="9525">
-            <a:noFill/>
-            <a:miter lim="800000"/>
-            <a:headEnd/>
-            <a:tailEnd/>
-          </a:ln>
-        </p:spPr>
-      </p:pic>
-      <p:sp>
-        <p:nvSpPr>
-          <p:cNvPr id="8" name="Right Arrow 7"/>
-          <p:cNvSpPr/>
-          <p:nvPr/>
-        </p:nvSpPr>
-        <p:spPr>
-          <a:xfrm>
-            <a:off x="1676400" y="2209800"/>
-            <a:ext cx="762000" cy="381000"/>
-          </a:xfrm>
-          <a:prstGeom prst="rightArrow">
-            <a:avLst/>
-          </a:prstGeom>
-          <a:solidFill>
-            <a:srgbClr val="FFFF00"/>
-          </a:solidFill>
-          <a:ln>
-            <a:solidFill>
-              <a:schemeClr val="bg1"/>
-            </a:solidFill>
-          </a:ln>
-        </p:spPr>
-        <p:style>
-          <a:lnRef idx="2">
-            <a:schemeClr val="accent1">
-              <a:shade val="50000"/>
-            </a:schemeClr>
-          </a:lnRef>
-          <a:fillRef idx="1">
-            <a:schemeClr val="accent1"/>
-          </a:fillRef>
-          <a:effectRef idx="0">
-            <a:schemeClr val="accent1"/>
-          </a:effectRef>
-          <a:fontRef idx="minor">
-            <a:schemeClr val="lt1"/>
-          </a:fontRef>
-        </p:style>
-        <p:txBody>
-          <a:bodyPr rtlCol="0" anchor="ctr"/>
-          <a:lstStyle/>
-          <a:p>
-            <a:pPr algn="ctr"/>
-            <a:endParaRPr lang="en-US"/>
-          </a:p>
-        </p:txBody>
-      </p:sp>
-      <p:pic>
-        <p:nvPicPr>
-          <p:cNvPr id="32772" name="Picture 4"/>
-          <p:cNvPicPr>
-            <a:picLocks noChangeAspect="1" noChangeArrowheads="1"/>
-          </p:cNvPicPr>
-          <p:nvPr/>
-        </p:nvPicPr>
-        <p:blipFill>
-          <a:blip r:embed="rId4" cstate="print"/>
-          <a:srcRect/>
-          <a:stretch>
-            <a:fillRect/>
-          </a:stretch>
-        </p:blipFill>
-        <p:spPr bwMode="auto">
-          <a:xfrm>
-            <a:off x="304800" y="3886200"/>
-            <a:ext cx="1842655" cy="381000"/>
-          </a:xfrm>
-          <a:prstGeom prst="rect">
-            <a:avLst/>
-          </a:prstGeom>
-          <a:noFill/>
-          <a:ln w="9525">
-            <a:noFill/>
-            <a:miter lim="800000"/>
-            <a:headEnd/>
-            <a:tailEnd/>
-          </a:ln>
-        </p:spPr>
-      </p:pic>
-      <p:pic>
-        <p:nvPicPr>
-          <p:cNvPr id="32773" name="Picture 5"/>
-          <p:cNvPicPr>
-            <a:picLocks noChangeAspect="1" noChangeArrowheads="1"/>
-          </p:cNvPicPr>
-          <p:nvPr/>
-        </p:nvPicPr>
-        <p:blipFill>
-          <a:blip r:embed="rId5" cstate="print"/>
-          <a:srcRect/>
-          <a:stretch>
-            <a:fillRect/>
-          </a:stretch>
-        </p:blipFill>
-        <p:spPr bwMode="auto">
-          <a:xfrm>
-            <a:off x="3200400" y="3886200"/>
-            <a:ext cx="1200150" cy="428625"/>
-          </a:xfrm>
-          <a:prstGeom prst="rect">
-            <a:avLst/>
-          </a:prstGeom>
-          <a:noFill/>
-          <a:ln w="9525">
-            <a:noFill/>
-            <a:miter lim="800000"/>
-            <a:headEnd/>
-            <a:tailEnd/>
-          </a:ln>
-        </p:spPr>
-      </p:pic>
-      <p:sp>
-        <p:nvSpPr>
-          <p:cNvPr id="11" name="Right Arrow 10"/>
-          <p:cNvSpPr/>
-          <p:nvPr/>
-        </p:nvSpPr>
-        <p:spPr>
-          <a:xfrm>
-            <a:off x="2286000" y="3886200"/>
-            <a:ext cx="762000" cy="381000"/>
-          </a:xfrm>
-          <a:prstGeom prst="rightArrow">
-            <a:avLst/>
-          </a:prstGeom>
-          <a:solidFill>
-            <a:srgbClr val="FFFF00"/>
-          </a:solidFill>
-          <a:ln>
-            <a:solidFill>
-              <a:schemeClr val="bg1"/>
-            </a:solidFill>
-          </a:ln>
-        </p:spPr>
-        <p:style>
-          <a:lnRef idx="2">
-            <a:schemeClr val="accent1">
-              <a:shade val="50000"/>
-            </a:schemeClr>
-          </a:lnRef>
-          <a:fillRef idx="1">
-            <a:schemeClr val="accent1"/>
-          </a:fillRef>
-          <a:effectRef idx="0">
-            <a:schemeClr val="accent1"/>
-          </a:effectRef>
-          <a:fontRef idx="minor">
-            <a:schemeClr val="lt1"/>
-          </a:fontRef>
-        </p:style>
-        <p:txBody>
-          <a:bodyPr rtlCol="0" anchor="ctr"/>
-          <a:lstStyle/>
-          <a:p>
-            <a:pPr algn="ctr"/>
-            <a:endParaRPr lang="en-US"/>
-          </a:p>
-        </p:txBody>
-      </p:sp>
     </p:spTree>
   </p:cSld>
   <p:clrMapOvr>
     <a:masterClrMapping/>
   </p:clrMapOvr>
+  <p:timing>
+    <p:tnLst>
+      <p:par>
+        <p:cTn id="1" dur="indefinite" restart="never" nodeType="tmRoot"/>
+      </p:par>
+    </p:tnLst>
+  </p:timing>
 </p:sld>
 </file>
 
@@ -4184,89 +3951,50 @@
           <a:chExt cx="0" cy="0"/>
         </a:xfrm>
       </p:grpSpPr>
-      <p:sp>
-        <p:nvSpPr>
-          <p:cNvPr id="2" name="Title 1"/>
-          <p:cNvSpPr>
-            <a:spLocks noGrp="1"/>
-          </p:cNvSpPr>
-          <p:nvPr>
-            <p:ph type="title"/>
-          </p:nvPr>
-        </p:nvSpPr>
-        <p:spPr/>
-        <p:txBody>
-          <a:bodyPr/>
-          <a:lstStyle/>
-          <a:p>
-            <a:pPr algn="ctr"/>
-            <a:r>
-              <a:rPr lang="en-US" dirty="0" smtClean="0"/>
-              <a:t>“Final” Technology Choices</a:t>
-            </a:r>
-            <a:endParaRPr lang="en-US" dirty="0"/>
-          </a:p>
-        </p:txBody>
-      </p:sp>
-      <p:sp>
-        <p:nvSpPr>
-          <p:cNvPr id="3" name="Content Placeholder 2"/>
-          <p:cNvSpPr>
-            <a:spLocks noGrp="1"/>
-          </p:cNvSpPr>
-          <p:nvPr>
-            <p:ph idx="1"/>
-          </p:nvPr>
-        </p:nvSpPr>
-        <p:spPr/>
-        <p:txBody>
-          <a:bodyPr/>
-          <a:lstStyle/>
-          <a:p>
-            <a:r>
-              <a:rPr lang="en-US" dirty="0" smtClean="0"/>
-              <a:t>C# </a:t>
-            </a:r>
-            <a:r>
-              <a:rPr lang="en-US" dirty="0" err="1" smtClean="0"/>
-              <a:t>Winforms</a:t>
-            </a:r>
-            <a:endParaRPr lang="en-US" dirty="0" smtClean="0"/>
-          </a:p>
-          <a:p>
-            <a:pPr lvl="1"/>
-            <a:r>
-              <a:rPr lang="en-US" dirty="0" smtClean="0"/>
-              <a:t>Mix of built in and custom controls</a:t>
-            </a:r>
-          </a:p>
-          <a:p>
-            <a:pPr lvl="1"/>
-            <a:r>
-              <a:rPr lang="en-US" dirty="0" smtClean="0"/>
-              <a:t>Utilize Windows on screen keyboard</a:t>
-            </a:r>
-          </a:p>
-          <a:p>
-            <a:r>
-              <a:rPr lang="en-US" dirty="0" smtClean="0"/>
-              <a:t>JSON to communicate with database</a:t>
-            </a:r>
-          </a:p>
-          <a:p>
-            <a:r>
-              <a:rPr lang="en-US" dirty="0" smtClean="0"/>
-              <a:t>Store survey data as log files</a:t>
-            </a:r>
-            <a:endParaRPr lang="en-US" dirty="0"/>
-          </a:p>
-        </p:txBody>
-      </p:sp>
+      <p:pic>
+        <p:nvPicPr>
+          <p:cNvPr id="4098" name="Picture 2"/>
+          <p:cNvPicPr>
+            <a:picLocks noChangeAspect="1" noChangeArrowheads="1"/>
+          </p:cNvPicPr>
+          <p:nvPr/>
+        </p:nvPicPr>
+        <p:blipFill>
+          <a:blip r:embed="rId2" cstate="print"/>
+          <a:srcRect/>
+          <a:stretch>
+            <a:fillRect/>
+          </a:stretch>
+        </p:blipFill>
+        <p:spPr bwMode="auto">
+          <a:xfrm>
+            <a:off x="-8483" y="0"/>
+            <a:ext cx="9160963" cy="6857999"/>
+          </a:xfrm>
+          <a:prstGeom prst="rect">
+            <a:avLst/>
+          </a:prstGeom>
+          <a:noFill/>
+          <a:ln w="9525">
+            <a:noFill/>
+            <a:miter lim="800000"/>
+            <a:headEnd/>
+            <a:tailEnd/>
+          </a:ln>
+        </p:spPr>
+      </p:pic>
     </p:spTree>
   </p:cSld>
   <p:clrMapOvr>
     <a:masterClrMapping/>
   </p:clrMapOvr>
+  <p:timing>
+    <p:tnLst>
+      <p:par>
+        <p:cTn id="1" dur="indefinite" restart="never" nodeType="tmRoot"/>
+      </p:par>
+    </p:tnLst>
+  </p:timing>
 </p:sld>
 </file>
 
@@ -4287,51 +4015,36 @@
           <a:chExt cx="0" cy="0"/>
         </a:xfrm>
       </p:grpSpPr>
-      <p:sp>
-        <p:nvSpPr>
-          <p:cNvPr id="2" name="Title 1"/>
-          <p:cNvSpPr>
-            <a:spLocks noGrp="1"/>
-          </p:cNvSpPr>
-          <p:nvPr>
-            <p:ph type="title"/>
-          </p:nvPr>
-        </p:nvSpPr>
-        <p:spPr/>
-        <p:txBody>
-          <a:bodyPr/>
-          <a:lstStyle/>
-          <a:p>
-            <a:pPr algn="ctr"/>
-            <a:r>
-              <a:rPr lang="en-US" dirty="0" smtClean="0"/>
-              <a:t>Timeline</a:t>
-            </a:r>
-            <a:endParaRPr lang="en-US" dirty="0"/>
-          </a:p>
-        </p:txBody>
-      </p:sp>
       <p:pic>
         <p:nvPicPr>
-          <p:cNvPr id="6" name="Content Placeholder 5" descr="Timeline.png"/>
+          <p:cNvPr id="5122" name="Picture 2"/>
           <p:cNvPicPr>
-            <a:picLocks noGrp="1" noChangeAspect="1"/>
+            <a:picLocks noChangeAspect="1" noChangeArrowheads="1"/>
           </p:cNvPicPr>
-          <p:nvPr>
-            <p:ph idx="1"/>
-          </p:nvPr>
+          <p:nvPr/>
         </p:nvPicPr>
         <p:blipFill>
           <a:blip r:embed="rId2" cstate="print"/>
+          <a:srcRect/>
           <a:stretch>
             <a:fillRect/>
           </a:stretch>
         </p:blipFill>
-        <p:spPr>
-          <a:xfrm>
-            <a:off x="0" y="2514600"/>
-            <a:ext cx="9144000" cy="2590800"/>
-          </a:xfrm>
+        <p:spPr bwMode="auto">
+          <a:xfrm>
+            <a:off x="-10563" y="0"/>
+            <a:ext cx="9165128" cy="6858000"/>
+          </a:xfrm>
+          <a:prstGeom prst="rect">
+            <a:avLst/>
+          </a:prstGeom>
+          <a:noFill/>
+          <a:ln w="9525">
+            <a:noFill/>
+            <a:miter lim="800000"/>
+            <a:headEnd/>
+            <a:tailEnd/>
+          </a:ln>
         </p:spPr>
       </p:pic>
     </p:spTree>
@@ -4384,7 +4097,183 @@
             <a:pPr algn="ctr"/>
             <a:r>
               <a:rPr lang="en-US" dirty="0" smtClean="0"/>
-              <a:t>Current Diagrams</a:t>
+              <a:t>After Further Thought…</a:t>
+            </a:r>
+            <a:endParaRPr lang="en-US" dirty="0"/>
+          </a:p>
+        </p:txBody>
+      </p:sp>
+      <p:sp>
+        <p:nvSpPr>
+          <p:cNvPr id="3" name="Content Placeholder 2"/>
+          <p:cNvSpPr>
+            <a:spLocks noGrp="1"/>
+          </p:cNvSpPr>
+          <p:nvPr>
+            <p:ph idx="1"/>
+          </p:nvPr>
+        </p:nvSpPr>
+        <p:spPr/>
+        <p:txBody>
+          <a:bodyPr/>
+          <a:lstStyle/>
+          <a:p>
+            <a:r>
+              <a:rPr lang="en-US" dirty="0" smtClean="0"/>
+              <a:t>Eliminate the loading screen</a:t>
+            </a:r>
+          </a:p>
+          <a:p>
+            <a:pPr lvl="1"/>
+            <a:r>
+              <a:rPr lang="en-US" dirty="0" smtClean="0"/>
+              <a:t>Two use cases</a:t>
+            </a:r>
+          </a:p>
+          <a:p>
+            <a:pPr lvl="2"/>
+            <a:r>
+              <a:rPr lang="en-US" dirty="0" smtClean="0"/>
+              <a:t>At </a:t>
+            </a:r>
+            <a:r>
+              <a:rPr lang="en-US" dirty="0" err="1" smtClean="0"/>
+              <a:t>wifi</a:t>
+            </a:r>
+            <a:r>
+              <a:rPr lang="en-US" dirty="0" smtClean="0"/>
+              <a:t> hotspot to update/upload</a:t>
+            </a:r>
+          </a:p>
+          <a:p>
+            <a:pPr lvl="2"/>
+            <a:r>
+              <a:rPr lang="en-US" dirty="0" smtClean="0"/>
+              <a:t>At lake to do surveys</a:t>
+            </a:r>
+          </a:p>
+          <a:p>
+            <a:r>
+              <a:rPr lang="en-US" dirty="0" smtClean="0"/>
+              <a:t>Store data in log files</a:t>
+            </a:r>
+          </a:p>
+          <a:p>
+            <a:pPr lvl="1"/>
+            <a:r>
+              <a:rPr lang="en-US" dirty="0" smtClean="0"/>
+              <a:t>Uploaded data will be sent through QA</a:t>
+            </a:r>
+          </a:p>
+          <a:p>
+            <a:r>
+              <a:rPr lang="en-US" dirty="0" smtClean="0"/>
+              <a:t>Display text to eliminate user error</a:t>
+            </a:r>
+          </a:p>
+          <a:p>
+            <a:pPr lvl="1"/>
+            <a:r>
+              <a:rPr lang="en-US" dirty="0" smtClean="0"/>
+              <a:t>Send codes to database</a:t>
+            </a:r>
+            <a:endParaRPr lang="en-US" dirty="0"/>
+          </a:p>
+        </p:txBody>
+      </p:sp>
+    </p:spTree>
+  </p:cSld>
+  <p:clrMapOvr>
+    <a:masterClrMapping/>
+  </p:clrMapOvr>
+</p:sld>
+</file>
+
+<file path=ppt/slides/slide14.xml><?xml version="1.0" encoding="utf-8"?>
+<p:sld xmlns:a="http://schemas.openxmlformats.org/drawingml/2006/main" xmlns:r="http://schemas.openxmlformats.org/officeDocument/2006/relationships" xmlns:p="http://schemas.openxmlformats.org/presentationml/2006/main">
+  <p:cSld>
+    <p:spTree>
+      <p:nvGrpSpPr>
+        <p:cNvPr id="1" name=""/>
+        <p:cNvGrpSpPr/>
+        <p:nvPr/>
+      </p:nvGrpSpPr>
+      <p:grpSpPr>
+        <a:xfrm>
+          <a:off x="0" y="0"/>
+          <a:ext cx="0" cy="0"/>
+          <a:chOff x="0" y="0"/>
+          <a:chExt cx="0" cy="0"/>
+        </a:xfrm>
+      </p:grpSpPr>
+      <p:sp>
+        <p:nvSpPr>
+          <p:cNvPr id="2" name="Title 1"/>
+          <p:cNvSpPr>
+            <a:spLocks noGrp="1"/>
+          </p:cNvSpPr>
+          <p:nvPr>
+            <p:ph type="title"/>
+          </p:nvPr>
+        </p:nvSpPr>
+        <p:spPr/>
+        <p:txBody>
+          <a:bodyPr/>
+          <a:lstStyle/>
+          <a:p>
+            <a:pPr algn="ctr"/>
+            <a:r>
+              <a:rPr lang="en-US" dirty="0" smtClean="0"/>
+              <a:t>Client Suggested Revisions</a:t>
+            </a:r>
+            <a:endParaRPr lang="en-US" dirty="0"/>
+          </a:p>
+        </p:txBody>
+      </p:sp>
+      <p:sp>
+        <p:nvSpPr>
+          <p:cNvPr id="3" name="Content Placeholder 2"/>
+          <p:cNvSpPr>
+            <a:spLocks noGrp="1"/>
+          </p:cNvSpPr>
+          <p:nvPr>
+            <p:ph idx="1"/>
+          </p:nvPr>
+        </p:nvSpPr>
+        <p:spPr>
+          <a:xfrm>
+            <a:off x="457200" y="3657600"/>
+            <a:ext cx="8229600" cy="2514916"/>
+          </a:xfrm>
+        </p:spPr>
+        <p:txBody>
+          <a:bodyPr/>
+          <a:lstStyle/>
+          <a:p>
+            <a:r>
+              <a:rPr lang="en-US" dirty="0" smtClean="0"/>
+              <a:t>Data has relationships </a:t>
+            </a:r>
+          </a:p>
+          <a:p>
+            <a:pPr lvl="1"/>
+            <a:r>
+              <a:rPr lang="en-US" dirty="0" smtClean="0"/>
+              <a:t>Fish kept with tag info</a:t>
+            </a:r>
+          </a:p>
+          <a:p>
+            <a:pPr lvl="1"/>
+            <a:r>
+              <a:rPr lang="en-US" dirty="0" smtClean="0"/>
+              <a:t>Fish kept without tag</a:t>
+            </a:r>
+          </a:p>
+          <a:p>
+            <a:pPr lvl="1"/>
+            <a:r>
+              <a:rPr lang="en-US" dirty="0" smtClean="0"/>
+              <a:t>Fish released</a:t>
             </a:r>
             <a:endParaRPr lang="en-US" dirty="0"/>
           </a:p>
@@ -4392,13 +4281,11 @@
       </p:sp>
       <p:pic>
         <p:nvPicPr>
-          <p:cNvPr id="7169" name="Picture 1" descr="C:\Users\Stacy\AppData\Local\Microsoft\Windows\INetCache\IE\XRZ68DEZ\MC900437081[1].png"/>
+          <p:cNvPr id="33794" name="Picture 2"/>
           <p:cNvPicPr>
-            <a:picLocks noGrp="1" noChangeAspect="1" noChangeArrowheads="1"/>
+            <a:picLocks noChangeAspect="1" noChangeArrowheads="1"/>
           </p:cNvPicPr>
-          <p:nvPr>
-            <p:ph idx="1"/>
-          </p:nvPr>
+          <p:nvPr/>
         </p:nvPicPr>
         <p:blipFill>
           <a:blip r:embed="rId2" cstate="print"/>
@@ -4409,13 +4296,19 @@
         </p:blipFill>
         <p:spPr bwMode="auto">
           <a:xfrm>
-            <a:off x="3099396" y="2438400"/>
-            <a:ext cx="2945209" cy="2945209"/>
+            <a:off x="852488" y="1676400"/>
+            <a:ext cx="7439025" cy="1828800"/>
           </a:xfrm>
           <a:prstGeom prst="rect">
             <a:avLst/>
           </a:prstGeom>
           <a:noFill/>
+          <a:ln w="9525">
+            <a:noFill/>
+            <a:miter lim="800000"/>
+            <a:headEnd/>
+            <a:tailEnd/>
+          </a:ln>
         </p:spPr>
       </p:pic>
     </p:spTree>
@@ -4426,7 +4319,568 @@
 </p:sld>
 </file>
 
-<file path=ppt/slides/slide14.xml><?xml version="1.0" encoding="utf-8"?>
+<file path=ppt/slides/slide15.xml><?xml version="1.0" encoding="utf-8"?>
+<p:sld xmlns:a="http://schemas.openxmlformats.org/drawingml/2006/main" xmlns:r="http://schemas.openxmlformats.org/officeDocument/2006/relationships" xmlns:p="http://schemas.openxmlformats.org/presentationml/2006/main">
+  <p:cSld>
+    <p:spTree>
+      <p:nvGrpSpPr>
+        <p:cNvPr id="1" name=""/>
+        <p:cNvGrpSpPr/>
+        <p:nvPr/>
+      </p:nvGrpSpPr>
+      <p:grpSpPr>
+        <a:xfrm>
+          <a:off x="0" y="0"/>
+          <a:ext cx="0" cy="0"/>
+          <a:chOff x="0" y="0"/>
+          <a:chExt cx="0" cy="0"/>
+        </a:xfrm>
+      </p:grpSpPr>
+      <p:sp>
+        <p:nvSpPr>
+          <p:cNvPr id="2" name="Title 1"/>
+          <p:cNvSpPr>
+            <a:spLocks noGrp="1"/>
+          </p:cNvSpPr>
+          <p:nvPr>
+            <p:ph type="title"/>
+          </p:nvPr>
+        </p:nvSpPr>
+        <p:spPr/>
+        <p:txBody>
+          <a:bodyPr/>
+          <a:lstStyle/>
+          <a:p>
+            <a:pPr algn="ctr"/>
+            <a:r>
+              <a:rPr lang="en-US" dirty="0" smtClean="0"/>
+              <a:t>Client Suggested Revisions</a:t>
+            </a:r>
+            <a:endParaRPr lang="en-US" dirty="0"/>
+          </a:p>
+        </p:txBody>
+      </p:sp>
+      <p:sp>
+        <p:nvSpPr>
+          <p:cNvPr id="4" name="Content Placeholder 3"/>
+          <p:cNvSpPr>
+            <a:spLocks noGrp="1"/>
+          </p:cNvSpPr>
+          <p:nvPr>
+            <p:ph sz="half" idx="2"/>
+          </p:nvPr>
+        </p:nvSpPr>
+        <p:spPr/>
+        <p:txBody>
+          <a:bodyPr/>
+          <a:lstStyle/>
+          <a:p>
+            <a:r>
+              <a:rPr lang="en-US" dirty="0" smtClean="0"/>
+              <a:t>No preselected defaults for toggle switches</a:t>
+            </a:r>
+          </a:p>
+          <a:p>
+            <a:r>
+              <a:rPr lang="en-US" dirty="0" smtClean="0"/>
+              <a:t>Remove edit/view functionality for previously entered data</a:t>
+            </a:r>
+            <a:endParaRPr lang="en-US" dirty="0"/>
+          </a:p>
+        </p:txBody>
+      </p:sp>
+      <p:pic>
+        <p:nvPicPr>
+          <p:cNvPr id="32770" name="Picture 2"/>
+          <p:cNvPicPr>
+            <a:picLocks noChangeAspect="1" noChangeArrowheads="1"/>
+          </p:cNvPicPr>
+          <p:nvPr/>
+        </p:nvPicPr>
+        <p:blipFill>
+          <a:blip r:embed="rId2" cstate="print"/>
+          <a:srcRect/>
+          <a:stretch>
+            <a:fillRect/>
+          </a:stretch>
+        </p:blipFill>
+        <p:spPr bwMode="auto">
+          <a:xfrm>
+            <a:off x="762000" y="1905000"/>
+            <a:ext cx="666750" cy="962025"/>
+          </a:xfrm>
+          <a:prstGeom prst="rect">
+            <a:avLst/>
+          </a:prstGeom>
+          <a:noFill/>
+          <a:ln w="9525">
+            <a:noFill/>
+            <a:miter lim="800000"/>
+            <a:headEnd/>
+            <a:tailEnd/>
+          </a:ln>
+        </p:spPr>
+      </p:pic>
+      <p:pic>
+        <p:nvPicPr>
+          <p:cNvPr id="32771" name="Picture 3"/>
+          <p:cNvPicPr>
+            <a:picLocks noChangeAspect="1" noChangeArrowheads="1"/>
+          </p:cNvPicPr>
+          <p:nvPr/>
+        </p:nvPicPr>
+        <p:blipFill>
+          <a:blip r:embed="rId3" cstate="print"/>
+          <a:srcRect/>
+          <a:stretch>
+            <a:fillRect/>
+          </a:stretch>
+        </p:blipFill>
+        <p:spPr bwMode="auto">
+          <a:xfrm>
+            <a:off x="2819400" y="2133600"/>
+            <a:ext cx="771525" cy="476250"/>
+          </a:xfrm>
+          <a:prstGeom prst="rect">
+            <a:avLst/>
+          </a:prstGeom>
+          <a:noFill/>
+          <a:ln w="9525">
+            <a:noFill/>
+            <a:miter lim="800000"/>
+            <a:headEnd/>
+            <a:tailEnd/>
+          </a:ln>
+        </p:spPr>
+      </p:pic>
+      <p:sp>
+        <p:nvSpPr>
+          <p:cNvPr id="8" name="Right Arrow 7"/>
+          <p:cNvSpPr/>
+          <p:nvPr/>
+        </p:nvSpPr>
+        <p:spPr>
+          <a:xfrm>
+            <a:off x="1676400" y="2209800"/>
+            <a:ext cx="762000" cy="381000"/>
+          </a:xfrm>
+          <a:prstGeom prst="rightArrow">
+            <a:avLst/>
+          </a:prstGeom>
+          <a:solidFill>
+            <a:srgbClr val="FFFF00"/>
+          </a:solidFill>
+          <a:ln>
+            <a:solidFill>
+              <a:schemeClr val="bg1"/>
+            </a:solidFill>
+          </a:ln>
+        </p:spPr>
+        <p:style>
+          <a:lnRef idx="2">
+            <a:schemeClr val="accent1">
+              <a:shade val="50000"/>
+            </a:schemeClr>
+          </a:lnRef>
+          <a:fillRef idx="1">
+            <a:schemeClr val="accent1"/>
+          </a:fillRef>
+          <a:effectRef idx="0">
+            <a:schemeClr val="accent1"/>
+          </a:effectRef>
+          <a:fontRef idx="minor">
+            <a:schemeClr val="lt1"/>
+          </a:fontRef>
+        </p:style>
+        <p:txBody>
+          <a:bodyPr rtlCol="0" anchor="ctr"/>
+          <a:lstStyle/>
+          <a:p>
+            <a:pPr algn="ctr"/>
+            <a:endParaRPr lang="en-US"/>
+          </a:p>
+        </p:txBody>
+      </p:sp>
+      <p:pic>
+        <p:nvPicPr>
+          <p:cNvPr id="32772" name="Picture 4"/>
+          <p:cNvPicPr>
+            <a:picLocks noChangeAspect="1" noChangeArrowheads="1"/>
+          </p:cNvPicPr>
+          <p:nvPr/>
+        </p:nvPicPr>
+        <p:blipFill>
+          <a:blip r:embed="rId4" cstate="print"/>
+          <a:srcRect/>
+          <a:stretch>
+            <a:fillRect/>
+          </a:stretch>
+        </p:blipFill>
+        <p:spPr bwMode="auto">
+          <a:xfrm>
+            <a:off x="304800" y="3886200"/>
+            <a:ext cx="1842655" cy="381000"/>
+          </a:xfrm>
+          <a:prstGeom prst="rect">
+            <a:avLst/>
+          </a:prstGeom>
+          <a:noFill/>
+          <a:ln w="9525">
+            <a:noFill/>
+            <a:miter lim="800000"/>
+            <a:headEnd/>
+            <a:tailEnd/>
+          </a:ln>
+        </p:spPr>
+      </p:pic>
+      <p:pic>
+        <p:nvPicPr>
+          <p:cNvPr id="32773" name="Picture 5"/>
+          <p:cNvPicPr>
+            <a:picLocks noChangeAspect="1" noChangeArrowheads="1"/>
+          </p:cNvPicPr>
+          <p:nvPr/>
+        </p:nvPicPr>
+        <p:blipFill>
+          <a:blip r:embed="rId5" cstate="print"/>
+          <a:srcRect/>
+          <a:stretch>
+            <a:fillRect/>
+          </a:stretch>
+        </p:blipFill>
+        <p:spPr bwMode="auto">
+          <a:xfrm>
+            <a:off x="3200400" y="3886200"/>
+            <a:ext cx="1200150" cy="428625"/>
+          </a:xfrm>
+          <a:prstGeom prst="rect">
+            <a:avLst/>
+          </a:prstGeom>
+          <a:noFill/>
+          <a:ln w="9525">
+            <a:noFill/>
+            <a:miter lim="800000"/>
+            <a:headEnd/>
+            <a:tailEnd/>
+          </a:ln>
+        </p:spPr>
+      </p:pic>
+      <p:sp>
+        <p:nvSpPr>
+          <p:cNvPr id="11" name="Right Arrow 10"/>
+          <p:cNvSpPr/>
+          <p:nvPr/>
+        </p:nvSpPr>
+        <p:spPr>
+          <a:xfrm>
+            <a:off x="2286000" y="3886200"/>
+            <a:ext cx="762000" cy="381000"/>
+          </a:xfrm>
+          <a:prstGeom prst="rightArrow">
+            <a:avLst/>
+          </a:prstGeom>
+          <a:solidFill>
+            <a:srgbClr val="FFFF00"/>
+          </a:solidFill>
+          <a:ln>
+            <a:solidFill>
+              <a:schemeClr val="bg1"/>
+            </a:solidFill>
+          </a:ln>
+        </p:spPr>
+        <p:style>
+          <a:lnRef idx="2">
+            <a:schemeClr val="accent1">
+              <a:shade val="50000"/>
+            </a:schemeClr>
+          </a:lnRef>
+          <a:fillRef idx="1">
+            <a:schemeClr val="accent1"/>
+          </a:fillRef>
+          <a:effectRef idx="0">
+            <a:schemeClr val="accent1"/>
+          </a:effectRef>
+          <a:fontRef idx="minor">
+            <a:schemeClr val="lt1"/>
+          </a:fontRef>
+        </p:style>
+        <p:txBody>
+          <a:bodyPr rtlCol="0" anchor="ctr"/>
+          <a:lstStyle/>
+          <a:p>
+            <a:pPr algn="ctr"/>
+            <a:endParaRPr lang="en-US"/>
+          </a:p>
+        </p:txBody>
+      </p:sp>
+    </p:spTree>
+  </p:cSld>
+  <p:clrMapOvr>
+    <a:masterClrMapping/>
+  </p:clrMapOvr>
+</p:sld>
+</file>
+
+<file path=ppt/slides/slide16.xml><?xml version="1.0" encoding="utf-8"?>
+<p:sld xmlns:a="http://schemas.openxmlformats.org/drawingml/2006/main" xmlns:r="http://schemas.openxmlformats.org/officeDocument/2006/relationships" xmlns:p="http://schemas.openxmlformats.org/presentationml/2006/main">
+  <p:cSld>
+    <p:spTree>
+      <p:nvGrpSpPr>
+        <p:cNvPr id="1" name=""/>
+        <p:cNvGrpSpPr/>
+        <p:nvPr/>
+      </p:nvGrpSpPr>
+      <p:grpSpPr>
+        <a:xfrm>
+          <a:off x="0" y="0"/>
+          <a:ext cx="0" cy="0"/>
+          <a:chOff x="0" y="0"/>
+          <a:chExt cx="0" cy="0"/>
+        </a:xfrm>
+      </p:grpSpPr>
+      <p:sp>
+        <p:nvSpPr>
+          <p:cNvPr id="2" name="Title 1"/>
+          <p:cNvSpPr>
+            <a:spLocks noGrp="1"/>
+          </p:cNvSpPr>
+          <p:nvPr>
+            <p:ph type="title"/>
+          </p:nvPr>
+        </p:nvSpPr>
+        <p:spPr/>
+        <p:txBody>
+          <a:bodyPr/>
+          <a:lstStyle/>
+          <a:p>
+            <a:pPr algn="ctr"/>
+            <a:r>
+              <a:rPr lang="en-US" dirty="0" smtClean="0"/>
+              <a:t>“Final” Technology Choices</a:t>
+            </a:r>
+            <a:endParaRPr lang="en-US" dirty="0"/>
+          </a:p>
+        </p:txBody>
+      </p:sp>
+      <p:sp>
+        <p:nvSpPr>
+          <p:cNvPr id="3" name="Content Placeholder 2"/>
+          <p:cNvSpPr>
+            <a:spLocks noGrp="1"/>
+          </p:cNvSpPr>
+          <p:nvPr>
+            <p:ph idx="1"/>
+          </p:nvPr>
+        </p:nvSpPr>
+        <p:spPr/>
+        <p:txBody>
+          <a:bodyPr/>
+          <a:lstStyle/>
+          <a:p>
+            <a:r>
+              <a:rPr lang="en-US" dirty="0" smtClean="0"/>
+              <a:t>C# </a:t>
+            </a:r>
+            <a:r>
+              <a:rPr lang="en-US" dirty="0" err="1" smtClean="0"/>
+              <a:t>Winforms</a:t>
+            </a:r>
+            <a:endParaRPr lang="en-US" dirty="0" smtClean="0"/>
+          </a:p>
+          <a:p>
+            <a:pPr lvl="1"/>
+            <a:r>
+              <a:rPr lang="en-US" dirty="0" smtClean="0"/>
+              <a:t>Mix of built in and custom controls</a:t>
+            </a:r>
+          </a:p>
+          <a:p>
+            <a:pPr lvl="1"/>
+            <a:r>
+              <a:rPr lang="en-US" dirty="0" smtClean="0"/>
+              <a:t>Utilize Windows on screen keyboard</a:t>
+            </a:r>
+          </a:p>
+          <a:p>
+            <a:r>
+              <a:rPr lang="en-US" dirty="0" smtClean="0"/>
+              <a:t>JSON to communicate with database</a:t>
+            </a:r>
+          </a:p>
+          <a:p>
+            <a:r>
+              <a:rPr lang="en-US" dirty="0" smtClean="0"/>
+              <a:t>Store survey data as log files</a:t>
+            </a:r>
+            <a:endParaRPr lang="en-US" dirty="0"/>
+          </a:p>
+        </p:txBody>
+      </p:sp>
+    </p:spTree>
+  </p:cSld>
+  <p:clrMapOvr>
+    <a:masterClrMapping/>
+  </p:clrMapOvr>
+</p:sld>
+</file>
+
+<file path=ppt/slides/slide17.xml><?xml version="1.0" encoding="utf-8"?>
+<p:sld xmlns:a="http://schemas.openxmlformats.org/drawingml/2006/main" xmlns:r="http://schemas.openxmlformats.org/officeDocument/2006/relationships" xmlns:p="http://schemas.openxmlformats.org/presentationml/2006/main">
+  <p:cSld>
+    <p:spTree>
+      <p:nvGrpSpPr>
+        <p:cNvPr id="1" name=""/>
+        <p:cNvGrpSpPr/>
+        <p:nvPr/>
+      </p:nvGrpSpPr>
+      <p:grpSpPr>
+        <a:xfrm>
+          <a:off x="0" y="0"/>
+          <a:ext cx="0" cy="0"/>
+          <a:chOff x="0" y="0"/>
+          <a:chExt cx="0" cy="0"/>
+        </a:xfrm>
+      </p:grpSpPr>
+      <p:sp>
+        <p:nvSpPr>
+          <p:cNvPr id="2" name="Title 1"/>
+          <p:cNvSpPr>
+            <a:spLocks noGrp="1"/>
+          </p:cNvSpPr>
+          <p:nvPr>
+            <p:ph type="title"/>
+          </p:nvPr>
+        </p:nvSpPr>
+        <p:spPr/>
+        <p:txBody>
+          <a:bodyPr/>
+          <a:lstStyle/>
+          <a:p>
+            <a:pPr algn="ctr"/>
+            <a:r>
+              <a:rPr lang="en-US" dirty="0" smtClean="0"/>
+              <a:t>Timeline</a:t>
+            </a:r>
+            <a:endParaRPr lang="en-US" dirty="0"/>
+          </a:p>
+        </p:txBody>
+      </p:sp>
+      <p:pic>
+        <p:nvPicPr>
+          <p:cNvPr id="6" name="Content Placeholder 5" descr="Timeline.png"/>
+          <p:cNvPicPr>
+            <a:picLocks noGrp="1" noChangeAspect="1"/>
+          </p:cNvPicPr>
+          <p:nvPr>
+            <p:ph idx="1"/>
+          </p:nvPr>
+        </p:nvPicPr>
+        <p:blipFill>
+          <a:blip r:embed="rId2" cstate="print"/>
+          <a:stretch>
+            <a:fillRect/>
+          </a:stretch>
+        </p:blipFill>
+        <p:spPr>
+          <a:xfrm>
+            <a:off x="0" y="2514600"/>
+            <a:ext cx="9144000" cy="2590800"/>
+          </a:xfrm>
+        </p:spPr>
+      </p:pic>
+    </p:spTree>
+  </p:cSld>
+  <p:clrMapOvr>
+    <a:masterClrMapping/>
+  </p:clrMapOvr>
+  <p:timing>
+    <p:tnLst>
+      <p:par>
+        <p:cTn id="1" dur="indefinite" restart="never" nodeType="tmRoot"/>
+      </p:par>
+    </p:tnLst>
+  </p:timing>
+</p:sld>
+</file>
+
+<file path=ppt/slides/slide18.xml><?xml version="1.0" encoding="utf-8"?>
+<p:sld xmlns:a="http://schemas.openxmlformats.org/drawingml/2006/main" xmlns:r="http://schemas.openxmlformats.org/officeDocument/2006/relationships" xmlns:p="http://schemas.openxmlformats.org/presentationml/2006/main">
+  <p:cSld>
+    <p:spTree>
+      <p:nvGrpSpPr>
+        <p:cNvPr id="1" name=""/>
+        <p:cNvGrpSpPr/>
+        <p:nvPr/>
+      </p:nvGrpSpPr>
+      <p:grpSpPr>
+        <a:xfrm>
+          <a:off x="0" y="0"/>
+          <a:ext cx="0" cy="0"/>
+          <a:chOff x="0" y="0"/>
+          <a:chExt cx="0" cy="0"/>
+        </a:xfrm>
+      </p:grpSpPr>
+      <p:sp>
+        <p:nvSpPr>
+          <p:cNvPr id="2" name="Title 1"/>
+          <p:cNvSpPr>
+            <a:spLocks noGrp="1"/>
+          </p:cNvSpPr>
+          <p:nvPr>
+            <p:ph type="title"/>
+          </p:nvPr>
+        </p:nvSpPr>
+        <p:spPr/>
+        <p:txBody>
+          <a:bodyPr/>
+          <a:lstStyle/>
+          <a:p>
+            <a:pPr algn="ctr"/>
+            <a:r>
+              <a:rPr lang="en-US" dirty="0" smtClean="0"/>
+              <a:t>Current Diagrams</a:t>
+            </a:r>
+            <a:endParaRPr lang="en-US" dirty="0"/>
+          </a:p>
+        </p:txBody>
+      </p:sp>
+      <p:pic>
+        <p:nvPicPr>
+          <p:cNvPr id="7169" name="Picture 1" descr="C:\Users\Stacy\AppData\Local\Microsoft\Windows\INetCache\IE\XRZ68DEZ\MC900437081[1].png"/>
+          <p:cNvPicPr>
+            <a:picLocks noGrp="1" noChangeAspect="1" noChangeArrowheads="1"/>
+          </p:cNvPicPr>
+          <p:nvPr>
+            <p:ph idx="1"/>
+          </p:nvPr>
+        </p:nvPicPr>
+        <p:blipFill>
+          <a:blip r:embed="rId2" cstate="print"/>
+          <a:srcRect/>
+          <a:stretch>
+            <a:fillRect/>
+          </a:stretch>
+        </p:blipFill>
+        <p:spPr bwMode="auto">
+          <a:xfrm>
+            <a:off x="3099396" y="2438400"/>
+            <a:ext cx="2945209" cy="2945209"/>
+          </a:xfrm>
+          <a:prstGeom prst="rect">
+            <a:avLst/>
+          </a:prstGeom>
+          <a:noFill/>
+        </p:spPr>
+      </p:pic>
+    </p:spTree>
+  </p:cSld>
+  <p:clrMapOvr>
+    <a:masterClrMapping/>
+  </p:clrMapOvr>
+</p:sld>
+</file>
+
+<file path=ppt/slides/slide19.xml><?xml version="1.0" encoding="utf-8"?>
 <p:sld xmlns:a="http://schemas.openxmlformats.org/drawingml/2006/main" xmlns:r="http://schemas.openxmlformats.org/officeDocument/2006/relationships" xmlns:p="http://schemas.openxmlformats.org/presentationml/2006/main">
   <p:cSld>
     <p:spTree>
@@ -4499,7 +4953,7 @@
 </p:sld>
 </file>
 
-<file path=ppt/slides/slide15.xml><?xml version="1.0" encoding="utf-8"?>
+<file path=ppt/slides/slide2.xml><?xml version="1.0" encoding="utf-8"?>
 <p:sld xmlns:a="http://schemas.openxmlformats.org/drawingml/2006/main" xmlns:r="http://schemas.openxmlformats.org/officeDocument/2006/relationships" xmlns:p="http://schemas.openxmlformats.org/presentationml/2006/main">
   <p:cSld>
     <p:spTree>
@@ -4531,33 +4985,64 @@
           <a:bodyPr/>
           <a:lstStyle/>
           <a:p>
-            <a:endParaRPr lang="en-US"/>
-          </a:p>
-        </p:txBody>
-      </p:sp>
-      <p:pic>
-        <p:nvPicPr>
-          <p:cNvPr id="4" name="Content Placeholder 3" descr="Class-UML-Diagrams.jpg"/>
-          <p:cNvPicPr>
-            <a:picLocks noGrp="1" noChangeAspect="1"/>
-          </p:cNvPicPr>
+            <a:pPr algn="ctr"/>
+            <a:r>
+              <a:rPr lang="en-US" dirty="0" smtClean="0"/>
+              <a:t>The Problem</a:t>
+            </a:r>
+            <a:endParaRPr lang="en-US" dirty="0"/>
+          </a:p>
+        </p:txBody>
+      </p:sp>
+      <p:sp>
+        <p:nvSpPr>
+          <p:cNvPr id="3" name="Content Placeholder 2"/>
+          <p:cNvSpPr>
+            <a:spLocks noGrp="1"/>
+          </p:cNvSpPr>
           <p:nvPr>
             <p:ph idx="1"/>
           </p:nvPr>
-        </p:nvPicPr>
-        <p:blipFill>
-          <a:blip r:embed="rId2" cstate="print"/>
-          <a:stretch>
-            <a:fillRect/>
-          </a:stretch>
-        </p:blipFill>
-        <p:spPr>
-          <a:xfrm>
-            <a:off x="0" y="1"/>
-            <a:ext cx="9143999" cy="6877912"/>
-          </a:xfrm>
-        </p:spPr>
-      </p:pic>
+        </p:nvSpPr>
+        <p:spPr/>
+        <p:txBody>
+          <a:bodyPr/>
+          <a:lstStyle/>
+          <a:p>
+            <a:r>
+              <a:rPr lang="en-US" dirty="0" smtClean="0"/>
+              <a:t>Surveys done by hand, mailed, and entered into Excel</a:t>
+            </a:r>
+          </a:p>
+          <a:p>
+            <a:pPr lvl="1"/>
+            <a:r>
+              <a:rPr lang="en-US" dirty="0" smtClean="0"/>
+              <a:t>Potential for loss</a:t>
+            </a:r>
+          </a:p>
+          <a:p>
+            <a:pPr lvl="1"/>
+            <a:r>
+              <a:rPr lang="en-US" dirty="0" smtClean="0"/>
+              <a:t>Inaccuracies in transcription</a:t>
+            </a:r>
+          </a:p>
+          <a:p>
+            <a:pPr lvl="1"/>
+            <a:r>
+              <a:rPr lang="en-US" dirty="0" smtClean="0"/>
+              <a:t>Long time to access the data</a:t>
+            </a:r>
+          </a:p>
+          <a:p>
+            <a:pPr lvl="1">
+              <a:buNone/>
+            </a:pPr>
+            <a:endParaRPr lang="en-US" dirty="0"/>
+          </a:p>
+        </p:txBody>
+      </p:sp>
     </p:spTree>
   </p:cSld>
   <p:clrMapOvr>
@@ -4566,7 +5051,7 @@
 </p:sld>
 </file>
 
-<file path=ppt/slides/slide16.xml><?xml version="1.0" encoding="utf-8"?>
+<file path=ppt/slides/slide20.xml><?xml version="1.0" encoding="utf-8"?>
 <p:sld xmlns:a="http://schemas.openxmlformats.org/drawingml/2006/main" xmlns:r="http://schemas.openxmlformats.org/officeDocument/2006/relationships" xmlns:p="http://schemas.openxmlformats.org/presentationml/2006/main">
   <p:cSld>
     <p:spTree>
@@ -4598,6 +5083,73 @@
           <a:bodyPr/>
           <a:lstStyle/>
           <a:p>
+            <a:endParaRPr lang="en-US"/>
+          </a:p>
+        </p:txBody>
+      </p:sp>
+      <p:pic>
+        <p:nvPicPr>
+          <p:cNvPr id="4" name="Content Placeholder 3" descr="Class-UML-Diagrams.jpg"/>
+          <p:cNvPicPr>
+            <a:picLocks noGrp="1" noChangeAspect="1"/>
+          </p:cNvPicPr>
+          <p:nvPr>
+            <p:ph idx="1"/>
+          </p:nvPr>
+        </p:nvPicPr>
+        <p:blipFill>
+          <a:blip r:embed="rId2" cstate="print"/>
+          <a:stretch>
+            <a:fillRect/>
+          </a:stretch>
+        </p:blipFill>
+        <p:spPr>
+          <a:xfrm>
+            <a:off x="0" y="1"/>
+            <a:ext cx="9143999" cy="6877912"/>
+          </a:xfrm>
+        </p:spPr>
+      </p:pic>
+    </p:spTree>
+  </p:cSld>
+  <p:clrMapOvr>
+    <a:masterClrMapping/>
+  </p:clrMapOvr>
+</p:sld>
+</file>
+
+<file path=ppt/slides/slide21.xml><?xml version="1.0" encoding="utf-8"?>
+<p:sld xmlns:a="http://schemas.openxmlformats.org/drawingml/2006/main" xmlns:r="http://schemas.openxmlformats.org/officeDocument/2006/relationships" xmlns:p="http://schemas.openxmlformats.org/presentationml/2006/main">
+  <p:cSld>
+    <p:spTree>
+      <p:nvGrpSpPr>
+        <p:cNvPr id="1" name=""/>
+        <p:cNvGrpSpPr/>
+        <p:nvPr/>
+      </p:nvGrpSpPr>
+      <p:grpSpPr>
+        <a:xfrm>
+          <a:off x="0" y="0"/>
+          <a:ext cx="0" cy="0"/>
+          <a:chOff x="0" y="0"/>
+          <a:chExt cx="0" cy="0"/>
+        </a:xfrm>
+      </p:grpSpPr>
+      <p:sp>
+        <p:nvSpPr>
+          <p:cNvPr id="2" name="Title 1"/>
+          <p:cNvSpPr>
+            <a:spLocks noGrp="1"/>
+          </p:cNvSpPr>
+          <p:nvPr>
+            <p:ph type="title"/>
+          </p:nvPr>
+        </p:nvSpPr>
+        <p:spPr/>
+        <p:txBody>
+          <a:bodyPr/>
+          <a:lstStyle/>
+          <a:p>
             <a:pPr algn="ctr"/>
             <a:r>
               <a:rPr lang="en-US" dirty="0" smtClean="0"/>
@@ -4652,7 +5204,7 @@
 </p:sld>
 </file>
 
-<file path=ppt/slides/slide17.xml><?xml version="1.0" encoding="utf-8"?>
+<file path=ppt/slides/slide22.xml><?xml version="1.0" encoding="utf-8"?>
 <p:sld xmlns:a="http://schemas.openxmlformats.org/drawingml/2006/main" xmlns:r="http://schemas.openxmlformats.org/officeDocument/2006/relationships" xmlns:p="http://schemas.openxmlformats.org/presentationml/2006/main">
   <p:cSld>
     <p:spTree>
@@ -4709,7 +5261,7 @@
 </p:sld>
 </file>
 
-<file path=ppt/slides/slide18.xml><?xml version="1.0" encoding="utf-8"?>
+<file path=ppt/slides/slide23.xml><?xml version="1.0" encoding="utf-8"?>
 <p:sld xmlns:a="http://schemas.openxmlformats.org/drawingml/2006/main" xmlns:r="http://schemas.openxmlformats.org/officeDocument/2006/relationships" xmlns:p="http://schemas.openxmlformats.org/presentationml/2006/main">
   <p:cSld>
     <p:spTree>
@@ -4784,7 +5336,7 @@
 </p:sld>
 </file>
 
-<file path=ppt/slides/slide19.xml><?xml version="1.0" encoding="utf-8"?>
+<file path=ppt/slides/slide24.xml><?xml version="1.0" encoding="utf-8"?>
 <p:sld xmlns:a="http://schemas.openxmlformats.org/drawingml/2006/main" xmlns:r="http://schemas.openxmlformats.org/officeDocument/2006/relationships" xmlns:p="http://schemas.openxmlformats.org/presentationml/2006/main">
   <p:cSld>
     <p:spTree>
@@ -4826,6 +5378,32 @@
           </a:prstGeom>
         </p:spPr>
       </p:pic>
+      <p:pic>
+        <p:nvPicPr>
+          <p:cNvPr id="1028" name="Picture 4" descr="https://openclipart.org/image/300px/svg_to_png/8831/Milkman666_Cone.png.png"/>
+          <p:cNvPicPr>
+            <a:picLocks noChangeAspect="1" noChangeArrowheads="1"/>
+          </p:cNvPicPr>
+          <p:nvPr/>
+        </p:nvPicPr>
+        <p:blipFill>
+          <a:blip r:embed="rId3" cstate="print"/>
+          <a:srcRect/>
+          <a:stretch>
+            <a:fillRect/>
+          </a:stretch>
+        </p:blipFill>
+        <p:spPr bwMode="auto">
+          <a:xfrm>
+            <a:off x="7467600" y="4648200"/>
+            <a:ext cx="1328928" cy="1828800"/>
+          </a:xfrm>
+          <a:prstGeom prst="rect">
+            <a:avLst/>
+          </a:prstGeom>
+          <a:noFill/>
+        </p:spPr>
+      </p:pic>
     </p:spTree>
   </p:cSld>
   <p:clrMapOvr>
@@ -4834,105 +5412,7 @@
 </p:sld>
 </file>
 
-<file path=ppt/slides/slide2.xml><?xml version="1.0" encoding="utf-8"?>
-<p:sld xmlns:a="http://schemas.openxmlformats.org/drawingml/2006/main" xmlns:r="http://schemas.openxmlformats.org/officeDocument/2006/relationships" xmlns:p="http://schemas.openxmlformats.org/presentationml/2006/main">
-  <p:cSld>
-    <p:spTree>
-      <p:nvGrpSpPr>
-        <p:cNvPr id="1" name=""/>
-        <p:cNvGrpSpPr/>
-        <p:nvPr/>
-      </p:nvGrpSpPr>
-      <p:grpSpPr>
-        <a:xfrm>
-          <a:off x="0" y="0"/>
-          <a:ext cx="0" cy="0"/>
-          <a:chOff x="0" y="0"/>
-          <a:chExt cx="0" cy="0"/>
-        </a:xfrm>
-      </p:grpSpPr>
-      <p:sp>
-        <p:nvSpPr>
-          <p:cNvPr id="2" name="Title 1"/>
-          <p:cNvSpPr>
-            <a:spLocks noGrp="1"/>
-          </p:cNvSpPr>
-          <p:nvPr>
-            <p:ph type="title"/>
-          </p:nvPr>
-        </p:nvSpPr>
-        <p:spPr/>
-        <p:txBody>
-          <a:bodyPr/>
-          <a:lstStyle/>
-          <a:p>
-            <a:pPr algn="ctr"/>
-            <a:r>
-              <a:rPr lang="en-US" dirty="0" smtClean="0"/>
-              <a:t>The Problem</a:t>
-            </a:r>
-            <a:endParaRPr lang="en-US" dirty="0"/>
-          </a:p>
-        </p:txBody>
-      </p:sp>
-      <p:sp>
-        <p:nvSpPr>
-          <p:cNvPr id="3" name="Content Placeholder 2"/>
-          <p:cNvSpPr>
-            <a:spLocks noGrp="1"/>
-          </p:cNvSpPr>
-          <p:nvPr>
-            <p:ph idx="1"/>
-          </p:nvPr>
-        </p:nvSpPr>
-        <p:spPr/>
-        <p:txBody>
-          <a:bodyPr/>
-          <a:lstStyle/>
-          <a:p>
-            <a:r>
-              <a:rPr lang="en-US" dirty="0" smtClean="0"/>
-              <a:t>Surveys done by hand, mailed, and entered into Excel</a:t>
-            </a:r>
-          </a:p>
-          <a:p>
-            <a:pPr lvl="1"/>
-            <a:r>
-              <a:rPr lang="en-US" dirty="0" smtClean="0"/>
-              <a:t>Potential for loss</a:t>
-            </a:r>
-          </a:p>
-          <a:p>
-            <a:pPr lvl="1"/>
-            <a:r>
-              <a:rPr lang="en-US" dirty="0" smtClean="0"/>
-              <a:t>Inaccuracies in transcription</a:t>
-            </a:r>
-          </a:p>
-          <a:p>
-            <a:pPr lvl="1"/>
-            <a:r>
-              <a:rPr lang="en-US" dirty="0" smtClean="0"/>
-              <a:t>Long time to access the data</a:t>
-            </a:r>
-          </a:p>
-          <a:p>
-            <a:pPr lvl="1">
-              <a:buNone/>
-            </a:pPr>
-            <a:endParaRPr lang="en-US" dirty="0"/>
-          </a:p>
-        </p:txBody>
-      </p:sp>
-    </p:spTree>
-  </p:cSld>
-  <p:clrMapOvr>
-    <a:masterClrMapping/>
-  </p:clrMapOvr>
-</p:sld>
-</file>
-
-<file path=ppt/slides/slide20.xml><?xml version="1.0" encoding="utf-8"?>
+<file path=ppt/slides/slide25.xml><?xml version="1.0" encoding="utf-8"?>
 <p:sld xmlns:a="http://schemas.openxmlformats.org/drawingml/2006/main" xmlns:r="http://schemas.openxmlformats.org/officeDocument/2006/relationships" xmlns:p="http://schemas.openxmlformats.org/presentationml/2006/main">
   <p:cSld>
     <p:spTree>
@@ -4973,6 +5453,32 @@
           </a:prstGeom>
         </p:spPr>
       </p:pic>
+      <p:pic>
+        <p:nvPicPr>
+          <p:cNvPr id="3" name="Picture 4" descr="https://openclipart.org/image/300px/svg_to_png/8831/Milkman666_Cone.png.png"/>
+          <p:cNvPicPr>
+            <a:picLocks noChangeAspect="1" noChangeArrowheads="1"/>
+          </p:cNvPicPr>
+          <p:nvPr/>
+        </p:nvPicPr>
+        <p:blipFill>
+          <a:blip r:embed="rId3" cstate="print"/>
+          <a:srcRect/>
+          <a:stretch>
+            <a:fillRect/>
+          </a:stretch>
+        </p:blipFill>
+        <p:spPr bwMode="auto">
+          <a:xfrm>
+            <a:off x="7543800" y="4876800"/>
+            <a:ext cx="1328928" cy="1828800"/>
+          </a:xfrm>
+          <a:prstGeom prst="rect">
+            <a:avLst/>
+          </a:prstGeom>
+          <a:noFill/>
+        </p:spPr>
+      </p:pic>
     </p:spTree>
   </p:cSld>
   <p:clrMapOvr>
@@ -4981,7 +5487,7 @@
 </p:sld>
 </file>
 
-<file path=ppt/slides/slide21.xml><?xml version="1.0" encoding="utf-8"?>
+<file path=ppt/slides/slide26.xml><?xml version="1.0" encoding="utf-8"?>
 <p:sld xmlns:a="http://schemas.openxmlformats.org/drawingml/2006/main" xmlns:r="http://schemas.openxmlformats.org/officeDocument/2006/relationships" xmlns:p="http://schemas.openxmlformats.org/presentationml/2006/main">
   <p:cSld>
     <p:spTree>
@@ -5022,6 +5528,32 @@
           </a:prstGeom>
         </p:spPr>
       </p:pic>
+      <p:pic>
+        <p:nvPicPr>
+          <p:cNvPr id="3" name="Picture 4" descr="https://openclipart.org/image/300px/svg_to_png/8831/Milkman666_Cone.png.png"/>
+          <p:cNvPicPr>
+            <a:picLocks noChangeAspect="1" noChangeArrowheads="1"/>
+          </p:cNvPicPr>
+          <p:nvPr/>
+        </p:nvPicPr>
+        <p:blipFill>
+          <a:blip r:embed="rId3" cstate="print"/>
+          <a:srcRect/>
+          <a:stretch>
+            <a:fillRect/>
+          </a:stretch>
+        </p:blipFill>
+        <p:spPr bwMode="auto">
+          <a:xfrm>
+            <a:off x="7543800" y="4800600"/>
+            <a:ext cx="1328928" cy="1828800"/>
+          </a:xfrm>
+          <a:prstGeom prst="rect">
+            <a:avLst/>
+          </a:prstGeom>
+          <a:noFill/>
+        </p:spPr>
+      </p:pic>
     </p:spTree>
   </p:cSld>
   <p:clrMapOvr>
@@ -5030,7 +5562,7 @@
 </p:sld>
 </file>
 
-<file path=ppt/slides/slide22.xml><?xml version="1.0" encoding="utf-8"?>
+<file path=ppt/slides/slide27.xml><?xml version="1.0" encoding="utf-8"?>
 <p:sld xmlns:a="http://schemas.openxmlformats.org/drawingml/2006/main" xmlns:r="http://schemas.openxmlformats.org/officeDocument/2006/relationships" xmlns:p="http://schemas.openxmlformats.org/presentationml/2006/main">
   <p:cSld>
     <p:spTree>
@@ -5711,113 +6243,114 @@
           <a:chExt cx="0" cy="0"/>
         </a:xfrm>
       </p:grpSpPr>
-      <p:sp>
-        <p:nvSpPr>
-          <p:cNvPr id="2" name="Title 1"/>
-          <p:cNvSpPr>
-            <a:spLocks noGrp="1"/>
-          </p:cNvSpPr>
-          <p:nvPr>
-            <p:ph type="title"/>
-          </p:nvPr>
-        </p:nvSpPr>
-        <p:spPr/>
-        <p:txBody>
-          <a:bodyPr/>
-          <a:lstStyle/>
-          <a:p>
-            <a:pPr algn="ctr"/>
-            <a:r>
-              <a:rPr lang="en-US" dirty="0" smtClean="0"/>
-              <a:t>After Further Thought…</a:t>
-            </a:r>
-            <a:endParaRPr lang="en-US" dirty="0"/>
-          </a:p>
-        </p:txBody>
-      </p:sp>
-      <p:sp>
-        <p:nvSpPr>
-          <p:cNvPr id="3" name="Content Placeholder 2"/>
-          <p:cNvSpPr>
-            <a:spLocks noGrp="1"/>
-          </p:cNvSpPr>
-          <p:nvPr>
-            <p:ph idx="1"/>
-          </p:nvPr>
-        </p:nvSpPr>
-        <p:spPr/>
-        <p:txBody>
-          <a:bodyPr/>
-          <a:lstStyle/>
-          <a:p>
-            <a:r>
-              <a:rPr lang="en-US" dirty="0" smtClean="0"/>
-              <a:t>Eliminate the loading screen</a:t>
-            </a:r>
-          </a:p>
-          <a:p>
-            <a:pPr lvl="1"/>
-            <a:r>
-              <a:rPr lang="en-US" dirty="0" smtClean="0"/>
-              <a:t>Two use cases</a:t>
-            </a:r>
-          </a:p>
-          <a:p>
-            <a:pPr lvl="2"/>
-            <a:r>
-              <a:rPr lang="en-US" dirty="0" smtClean="0"/>
-              <a:t>At </a:t>
-            </a:r>
-            <a:r>
-              <a:rPr lang="en-US" dirty="0" err="1" smtClean="0"/>
-              <a:t>wifi</a:t>
-            </a:r>
-            <a:r>
-              <a:rPr lang="en-US" dirty="0" smtClean="0"/>
-              <a:t> hotspot to update/upload</a:t>
-            </a:r>
-          </a:p>
-          <a:p>
-            <a:pPr lvl="2"/>
-            <a:r>
-              <a:rPr lang="en-US" dirty="0" smtClean="0"/>
-              <a:t>At lake to do surveys</a:t>
-            </a:r>
-          </a:p>
-          <a:p>
-            <a:r>
-              <a:rPr lang="en-US" dirty="0" smtClean="0"/>
-              <a:t>Store data in log files</a:t>
-            </a:r>
-          </a:p>
-          <a:p>
-            <a:pPr lvl="1"/>
-            <a:r>
-              <a:rPr lang="en-US" dirty="0" smtClean="0"/>
-              <a:t>Uploaded data will be sent through QA</a:t>
-            </a:r>
-          </a:p>
-          <a:p>
-            <a:r>
-              <a:rPr lang="en-US" dirty="0" smtClean="0"/>
-              <a:t>Display text to eliminate user error</a:t>
-            </a:r>
-          </a:p>
-          <a:p>
-            <a:pPr lvl="1"/>
-            <a:r>
-              <a:rPr lang="en-US" dirty="0" smtClean="0"/>
-              <a:t>Send codes to database</a:t>
-            </a:r>
-            <a:endParaRPr lang="en-US" dirty="0"/>
-          </a:p>
-        </p:txBody>
-      </p:sp>
+      <p:pic>
+        <p:nvPicPr>
+          <p:cNvPr id="1026" name="Picture 2"/>
+          <p:cNvPicPr>
+            <a:picLocks noChangeAspect="1" noChangeArrowheads="1"/>
+          </p:cNvPicPr>
+          <p:nvPr/>
+        </p:nvPicPr>
+        <p:blipFill>
+          <a:blip r:embed="rId2" cstate="print"/>
+          <a:srcRect/>
+          <a:stretch>
+            <a:fillRect/>
+          </a:stretch>
+        </p:blipFill>
+        <p:spPr bwMode="auto">
+          <a:xfrm>
+            <a:off x="0" y="0"/>
+            <a:ext cx="9144000" cy="6858000"/>
+          </a:xfrm>
+          <a:prstGeom prst="rect">
+            <a:avLst/>
+          </a:prstGeom>
+          <a:noFill/>
+          <a:ln w="9525">
+            <a:noFill/>
+            <a:miter lim="800000"/>
+            <a:headEnd/>
+            <a:tailEnd/>
+          </a:ln>
+        </p:spPr>
+      </p:pic>
+      <p:pic>
+        <p:nvPicPr>
+          <p:cNvPr id="1027" name="Picture 3"/>
+          <p:cNvPicPr>
+            <a:picLocks noChangeAspect="1" noChangeArrowheads="1"/>
+          </p:cNvPicPr>
+          <p:nvPr/>
+        </p:nvPicPr>
+        <p:blipFill>
+          <a:blip r:embed="rId2" cstate="print"/>
+          <a:srcRect/>
+          <a:stretch>
+            <a:fillRect/>
+          </a:stretch>
+        </p:blipFill>
+        <p:spPr bwMode="auto">
+          <a:xfrm>
+            <a:off x="0" y="0"/>
+            <a:ext cx="9144000" cy="6858000"/>
+          </a:xfrm>
+          <a:prstGeom prst="rect">
+            <a:avLst/>
+          </a:prstGeom>
+          <a:noFill/>
+          <a:ln w="9525">
+            <a:noFill/>
+            <a:miter lim="800000"/>
+            <a:headEnd/>
+            <a:tailEnd/>
+          </a:ln>
+        </p:spPr>
+      </p:pic>
+      <p:pic>
+        <p:nvPicPr>
+          <p:cNvPr id="1028" name="Picture 4"/>
+          <p:cNvPicPr>
+            <a:picLocks noChangeAspect="1" noChangeArrowheads="1"/>
+          </p:cNvPicPr>
+          <p:nvPr/>
+        </p:nvPicPr>
+        <p:blipFill>
+          <a:blip r:embed="rId3" cstate="print"/>
+          <a:srcRect/>
+          <a:stretch>
+            <a:fillRect/>
+          </a:stretch>
+        </p:blipFill>
+        <p:spPr bwMode="auto">
+          <a:xfrm>
+            <a:off x="4218" y="0"/>
+            <a:ext cx="9139782" cy="6861166"/>
+          </a:xfrm>
+          <a:prstGeom prst="rect">
+            <a:avLst/>
+          </a:prstGeom>
+          <a:noFill/>
+          <a:ln w="9525">
+            <a:noFill/>
+            <a:miter lim="800000"/>
+            <a:headEnd/>
+            <a:tailEnd/>
+          </a:ln>
+        </p:spPr>
+      </p:pic>
     </p:spTree>
   </p:cSld>
   <p:clrMapOvr>
     <a:masterClrMapping/>
   </p:clrMapOvr>
+  <p:timing>
+    <p:tnLst>
+      <p:par>
+        <p:cTn id="1" dur="indefinite" restart="never" nodeType="tmRoot"/>
+      </p:par>
+    </p:tnLst>
+  </p:timing>
 </p:sld>
 </file>
 
@@ -5838,82 +6371,9 @@
           <a:chExt cx="0" cy="0"/>
         </a:xfrm>
       </p:grpSpPr>
-      <p:sp>
-        <p:nvSpPr>
-          <p:cNvPr id="2" name="Title 1"/>
-          <p:cNvSpPr>
-            <a:spLocks noGrp="1"/>
-          </p:cNvSpPr>
-          <p:nvPr>
-            <p:ph type="title"/>
-          </p:nvPr>
-        </p:nvSpPr>
-        <p:spPr/>
-        <p:txBody>
-          <a:bodyPr/>
-          <a:lstStyle/>
-          <a:p>
-            <a:pPr algn="ctr"/>
-            <a:r>
-              <a:rPr lang="en-US" dirty="0" smtClean="0"/>
-              <a:t>Client Suggested Revisions</a:t>
-            </a:r>
-            <a:endParaRPr lang="en-US" dirty="0"/>
-          </a:p>
-        </p:txBody>
-      </p:sp>
-      <p:sp>
-        <p:nvSpPr>
-          <p:cNvPr id="3" name="Content Placeholder 2"/>
-          <p:cNvSpPr>
-            <a:spLocks noGrp="1"/>
-          </p:cNvSpPr>
-          <p:nvPr>
-            <p:ph idx="1"/>
-          </p:nvPr>
-        </p:nvSpPr>
-        <p:spPr>
-          <a:xfrm>
-            <a:off x="457200" y="3657600"/>
-            <a:ext cx="8229600" cy="2514916"/>
-          </a:xfrm>
-        </p:spPr>
-        <p:txBody>
-          <a:bodyPr/>
-          <a:lstStyle/>
-          <a:p>
-            <a:r>
-              <a:rPr lang="en-US" dirty="0" smtClean="0"/>
-              <a:t>Data has relationships </a:t>
-            </a:r>
-          </a:p>
-          <a:p>
-            <a:pPr lvl="1"/>
-            <a:r>
-              <a:rPr lang="en-US" dirty="0" smtClean="0"/>
-              <a:t>Fish kept with tag info</a:t>
-            </a:r>
-          </a:p>
-          <a:p>
-            <a:pPr lvl="1"/>
-            <a:r>
-              <a:rPr lang="en-US" dirty="0" smtClean="0"/>
-              <a:t>Fish kept without tag</a:t>
-            </a:r>
-          </a:p>
-          <a:p>
-            <a:pPr lvl="1"/>
-            <a:r>
-              <a:rPr lang="en-US" dirty="0" smtClean="0"/>
-              <a:t>Fish released</a:t>
-            </a:r>
-            <a:endParaRPr lang="en-US" dirty="0"/>
-          </a:p>
-        </p:txBody>
-      </p:sp>
       <p:pic>
         <p:nvPicPr>
-          <p:cNvPr id="33794" name="Picture 2"/>
+          <p:cNvPr id="2050" name="Picture 2"/>
           <p:cNvPicPr>
             <a:picLocks noChangeAspect="1" noChangeArrowheads="1"/>
           </p:cNvPicPr>
@@ -5928,8 +6388,8 @@
         </p:blipFill>
         <p:spPr bwMode="auto">
           <a:xfrm>
-            <a:off x="852488" y="1676400"/>
-            <a:ext cx="7439025" cy="1828800"/>
+            <a:off x="-25543" y="0"/>
+            <a:ext cx="9195084" cy="6858000"/>
           </a:xfrm>
           <a:prstGeom prst="rect">
             <a:avLst/>
@@ -5948,6 +6408,13 @@
   <p:clrMapOvr>
     <a:masterClrMapping/>
   </p:clrMapOvr>
+  <p:timing>
+    <p:tnLst>
+      <p:par>
+        <p:cTn id="1" dur="indefinite" restart="never" nodeType="tmRoot"/>
+      </p:par>
+    </p:tnLst>
+  </p:timing>
 </p:sld>
 </file>
 

</xml_diff>